<commit_message>
fix images size : informatique
</commit_message>
<xml_diff>
--- a/_chapitres/PowerPointFiles/2.2.informatique.pptx
+++ b/_chapitres/PowerPointFiles/2.2.informatique.pptx
@@ -216,7 +216,7 @@
           <a:p>
             <a:fld id="{C12B9716-1460-42A8-AAA7-0346833AE1E2}" type="datetimeFigureOut">
               <a:rPr lang="fr-FR" smtClean="0"/>
-              <a:t>06/03/2024</a:t>
+              <a:t>09/03/2024</a:t>
             </a:fld>
             <a:endParaRPr lang="fr-FR"/>
           </a:p>
@@ -381,7 +381,7 @@
           <a:p>
             <a:fld id="{3818B89F-C41D-4E28-AAD6-F41270CA1CF2}" type="datetimeFigureOut">
               <a:rPr lang="fr-FR" smtClean="0"/>
-              <a:t>06/03/2024</a:t>
+              <a:t>09/03/2024</a:t>
             </a:fld>
             <a:endParaRPr lang="fr-FR"/>
           </a:p>
@@ -774,7 +774,7 @@
     </p:spTree>
     <p:extLst>
       <p:ext uri="{BB962C8B-B14F-4D97-AF65-F5344CB8AC3E}">
-        <p14:creationId xmlns:p14="http://schemas.microsoft.com/office/powerpoint/2010/main" val="1679136951"/>
+        <p14:creationId xmlns:p14="http://schemas.microsoft.com/office/powerpoint/2010/main" val="797561396"/>
       </p:ext>
     </p:extLst>
   </p:cSld>
@@ -876,7 +876,7 @@
     </p:spTree>
     <p:extLst>
       <p:ext uri="{BB962C8B-B14F-4D97-AF65-F5344CB8AC3E}">
-        <p14:creationId xmlns:p14="http://schemas.microsoft.com/office/powerpoint/2010/main" val="1521834196"/>
+        <p14:creationId xmlns:p14="http://schemas.microsoft.com/office/powerpoint/2010/main" val="1575584734"/>
       </p:ext>
     </p:extLst>
   </p:cSld>
@@ -1005,7 +1005,7 @@
     </p:spTree>
     <p:extLst>
       <p:ext uri="{BB962C8B-B14F-4D97-AF65-F5344CB8AC3E}">
-        <p14:creationId xmlns:p14="http://schemas.microsoft.com/office/powerpoint/2010/main" val="44134085"/>
+        <p14:creationId xmlns:p14="http://schemas.microsoft.com/office/powerpoint/2010/main" val="1552045489"/>
       </p:ext>
     </p:extLst>
   </p:cSld>
@@ -1119,7 +1119,7 @@
     </p:spTree>
     <p:extLst>
       <p:ext uri="{BB962C8B-B14F-4D97-AF65-F5344CB8AC3E}">
-        <p14:creationId xmlns:p14="http://schemas.microsoft.com/office/powerpoint/2010/main" val="3267075567"/>
+        <p14:creationId xmlns:p14="http://schemas.microsoft.com/office/powerpoint/2010/main" val="3418505000"/>
       </p:ext>
     </p:extLst>
   </p:cSld>
@@ -1215,7 +1215,7 @@
     </p:spTree>
     <p:extLst>
       <p:ext uri="{BB962C8B-B14F-4D97-AF65-F5344CB8AC3E}">
-        <p14:creationId xmlns:p14="http://schemas.microsoft.com/office/powerpoint/2010/main" val="4169987854"/>
+        <p14:creationId xmlns:p14="http://schemas.microsoft.com/office/powerpoint/2010/main" val="1229545498"/>
       </p:ext>
     </p:extLst>
   </p:cSld>
@@ -1335,7 +1335,7 @@
     </p:spTree>
     <p:extLst>
       <p:ext uri="{BB962C8B-B14F-4D97-AF65-F5344CB8AC3E}">
-        <p14:creationId xmlns:p14="http://schemas.microsoft.com/office/powerpoint/2010/main" val="3328447232"/>
+        <p14:creationId xmlns:p14="http://schemas.microsoft.com/office/powerpoint/2010/main" val="652006918"/>
       </p:ext>
     </p:extLst>
   </p:cSld>
@@ -1431,7 +1431,7 @@
     </p:spTree>
     <p:extLst>
       <p:ext uri="{BB962C8B-B14F-4D97-AF65-F5344CB8AC3E}">
-        <p14:creationId xmlns:p14="http://schemas.microsoft.com/office/powerpoint/2010/main" val="2056935940"/>
+        <p14:creationId xmlns:p14="http://schemas.microsoft.com/office/powerpoint/2010/main" val="1521034415"/>
       </p:ext>
     </p:extLst>
   </p:cSld>
@@ -1569,7 +1569,7 @@
     </p:spTree>
     <p:extLst>
       <p:ext uri="{BB962C8B-B14F-4D97-AF65-F5344CB8AC3E}">
-        <p14:creationId xmlns:p14="http://schemas.microsoft.com/office/powerpoint/2010/main" val="1076072995"/>
+        <p14:creationId xmlns:p14="http://schemas.microsoft.com/office/powerpoint/2010/main" val="3722981841"/>
       </p:ext>
     </p:extLst>
   </p:cSld>
@@ -1707,7 +1707,7 @@
     </p:spTree>
     <p:extLst>
       <p:ext uri="{BB962C8B-B14F-4D97-AF65-F5344CB8AC3E}">
-        <p14:creationId xmlns:p14="http://schemas.microsoft.com/office/powerpoint/2010/main" val="3574170156"/>
+        <p14:creationId xmlns:p14="http://schemas.microsoft.com/office/powerpoint/2010/main" val="696486678"/>
       </p:ext>
     </p:extLst>
   </p:cSld>
@@ -1839,7 +1839,7 @@
     </p:spTree>
     <p:extLst>
       <p:ext uri="{BB962C8B-B14F-4D97-AF65-F5344CB8AC3E}">
-        <p14:creationId xmlns:p14="http://schemas.microsoft.com/office/powerpoint/2010/main" val="3838343692"/>
+        <p14:creationId xmlns:p14="http://schemas.microsoft.com/office/powerpoint/2010/main" val="1203991641"/>
       </p:ext>
     </p:extLst>
   </p:cSld>
@@ -1929,7 +1929,7 @@
     </p:spTree>
     <p:extLst>
       <p:ext uri="{BB962C8B-B14F-4D97-AF65-F5344CB8AC3E}">
-        <p14:creationId xmlns:p14="http://schemas.microsoft.com/office/powerpoint/2010/main" val="2686085416"/>
+        <p14:creationId xmlns:p14="http://schemas.microsoft.com/office/powerpoint/2010/main" val="3056455713"/>
       </p:ext>
     </p:extLst>
   </p:cSld>
@@ -2067,7 +2067,7 @@
     </p:spTree>
     <p:extLst>
       <p:ext uri="{BB962C8B-B14F-4D97-AF65-F5344CB8AC3E}">
-        <p14:creationId xmlns:p14="http://schemas.microsoft.com/office/powerpoint/2010/main" val="193596561"/>
+        <p14:creationId xmlns:p14="http://schemas.microsoft.com/office/powerpoint/2010/main" val="2973015979"/>
       </p:ext>
     </p:extLst>
   </p:cSld>
@@ -3431,7 +3431,7 @@
           <a:p>
             <a:fld id="{29198A9F-4C83-4502-BE7A-946C4A44E636}" type="datetimeFigureOut">
               <a:rPr lang="fr-FR" smtClean="0"/>
-              <a:t>06/03/2024</a:t>
+              <a:t>09/03/2024</a:t>
             </a:fld>
             <a:endParaRPr lang="fr-FR"/>
           </a:p>
@@ -4122,7 +4122,7 @@
           <a:p>
             <a:fld id="{29198A9F-4C83-4502-BE7A-946C4A44E636}" type="datetimeFigureOut">
               <a:rPr lang="fr-FR" smtClean="0"/>
-              <a:t>06/03/2024</a:t>
+              <a:t>09/03/2024</a:t>
             </a:fld>
             <a:endParaRPr lang="fr-FR"/>
           </a:p>
@@ -4406,7 +4406,7 @@
           <a:p>
             <a:fld id="{29198A9F-4C83-4502-BE7A-946C4A44E636}" type="datetimeFigureOut">
               <a:rPr lang="fr-FR" smtClean="0"/>
-              <a:t>06/03/2024</a:t>
+              <a:t>09/03/2024</a:t>
             </a:fld>
             <a:endParaRPr lang="fr-FR"/>
           </a:p>
@@ -6979,7 +6979,7 @@
             <a:fld id="{29198A9F-4C83-4502-BE7A-946C4A44E636}" type="datetimeFigureOut">
               <a:rPr lang="fr-FR" smtClean="0"/>
               <a:pPr/>
-              <a:t>06/03/2024</a:t>
+              <a:t>09/03/2024</a:t>
             </a:fld>
             <a:endParaRPr lang="fr-FR"/>
           </a:p>
@@ -9232,7 +9232,7 @@
             <a:fld id="{29198A9F-4C83-4502-BE7A-946C4A44E636}" type="datetimeFigureOut">
               <a:rPr lang="fr-FR" smtClean="0"/>
               <a:pPr/>
-              <a:t>06/03/2024</a:t>
+              <a:t>09/03/2024</a:t>
             </a:fld>
             <a:endParaRPr lang="fr-FR"/>
           </a:p>
@@ -9502,7 +9502,7 @@
             <a:fld id="{29198A9F-4C83-4502-BE7A-946C4A44E636}" type="datetimeFigureOut">
               <a:rPr lang="fr-FR" smtClean="0"/>
               <a:pPr/>
-              <a:t>06/03/2024</a:t>
+              <a:t>09/03/2024</a:t>
             </a:fld>
             <a:endParaRPr lang="fr-FR"/>
           </a:p>
@@ -9570,7 +9570,7 @@
           <a:p>
             <a:fld id="{29198A9F-4C83-4502-BE7A-946C4A44E636}" type="datetimeFigureOut">
               <a:rPr lang="fr-FR" smtClean="0"/>
-              <a:t>06/03/2024</a:t>
+              <a:t>09/03/2024</a:t>
             </a:fld>
             <a:endParaRPr lang="fr-FR"/>
           </a:p>
@@ -13303,7 +13303,7 @@
     </p:spTree>
     <p:extLst>
       <p:ext uri="{BB962C8B-B14F-4D97-AF65-F5344CB8AC3E}">
-        <p14:creationId xmlns:p14="http://schemas.microsoft.com/office/powerpoint/2010/main" val="1114984494"/>
+        <p14:creationId xmlns:p14="http://schemas.microsoft.com/office/powerpoint/2010/main" val="3978694136"/>
       </p:ext>
     </p:extLst>
   </p:cSld>
@@ -13647,7 +13647,7 @@
     </p:spTree>
     <p:extLst>
       <p:ext uri="{BB962C8B-B14F-4D97-AF65-F5344CB8AC3E}">
-        <p14:creationId xmlns:p14="http://schemas.microsoft.com/office/powerpoint/2010/main" val="4050523048"/>
+        <p14:creationId xmlns:p14="http://schemas.microsoft.com/office/powerpoint/2010/main" val="3529009670"/>
       </p:ext>
     </p:extLst>
   </p:cSld>
@@ -13854,7 +13854,7 @@
     </p:spTree>
     <p:extLst>
       <p:ext uri="{BB962C8B-B14F-4D97-AF65-F5344CB8AC3E}">
-        <p14:creationId xmlns:p14="http://schemas.microsoft.com/office/powerpoint/2010/main" val="1826704670"/>
+        <p14:creationId xmlns:p14="http://schemas.microsoft.com/office/powerpoint/2010/main" val="1303448373"/>
       </p:ext>
     </p:extLst>
   </p:cSld>
@@ -13968,7 +13968,7 @@
     </p:spTree>
     <p:extLst>
       <p:ext uri="{BB962C8B-B14F-4D97-AF65-F5344CB8AC3E}">
-        <p14:creationId xmlns:p14="http://schemas.microsoft.com/office/powerpoint/2010/main" val="139307788"/>
+        <p14:creationId xmlns:p14="http://schemas.microsoft.com/office/powerpoint/2010/main" val="2108208357"/>
       </p:ext>
     </p:extLst>
   </p:cSld>
@@ -14123,7 +14123,7 @@
     </p:spTree>
     <p:extLst>
       <p:ext uri="{BB962C8B-B14F-4D97-AF65-F5344CB8AC3E}">
-        <p14:creationId xmlns:p14="http://schemas.microsoft.com/office/powerpoint/2010/main" val="2649059755"/>
+        <p14:creationId xmlns:p14="http://schemas.microsoft.com/office/powerpoint/2010/main" val="2191039697"/>
       </p:ext>
     </p:extLst>
   </p:cSld>
@@ -14459,7 +14459,7 @@
     </p:spTree>
     <p:extLst>
       <p:ext uri="{BB962C8B-B14F-4D97-AF65-F5344CB8AC3E}">
-        <p14:creationId xmlns:p14="http://schemas.microsoft.com/office/powerpoint/2010/main" val="1646995964"/>
+        <p14:creationId xmlns:p14="http://schemas.microsoft.com/office/powerpoint/2010/main" val="3960010958"/>
       </p:ext>
     </p:extLst>
   </p:cSld>
@@ -14899,7 +14899,7 @@
     </p:spTree>
     <p:extLst>
       <p:ext uri="{BB962C8B-B14F-4D97-AF65-F5344CB8AC3E}">
-        <p14:creationId xmlns:p14="http://schemas.microsoft.com/office/powerpoint/2010/main" val="1614714402"/>
+        <p14:creationId xmlns:p14="http://schemas.microsoft.com/office/powerpoint/2010/main" val="4264606319"/>
       </p:ext>
     </p:extLst>
   </p:cSld>
@@ -15647,7 +15647,7 @@
     </p:spTree>
     <p:extLst>
       <p:ext uri="{BB962C8B-B14F-4D97-AF65-F5344CB8AC3E}">
-        <p14:creationId xmlns:p14="http://schemas.microsoft.com/office/powerpoint/2010/main" val="1414216439"/>
+        <p14:creationId xmlns:p14="http://schemas.microsoft.com/office/powerpoint/2010/main" val="3913352083"/>
       </p:ext>
     </p:extLst>
   </p:cSld>
@@ -16160,7 +16160,7 @@
     </p:spTree>
     <p:extLst>
       <p:ext uri="{BB962C8B-B14F-4D97-AF65-F5344CB8AC3E}">
-        <p14:creationId xmlns:p14="http://schemas.microsoft.com/office/powerpoint/2010/main" val="1778899778"/>
+        <p14:creationId xmlns:p14="http://schemas.microsoft.com/office/powerpoint/2010/main" val="3884938548"/>
       </p:ext>
     </p:extLst>
   </p:cSld>
@@ -17799,7 +17799,7 @@
     </p:spTree>
     <p:extLst>
       <p:ext uri="{BB962C8B-B14F-4D97-AF65-F5344CB8AC3E}">
-        <p14:creationId xmlns:p14="http://schemas.microsoft.com/office/powerpoint/2010/main" val="3667992282"/>
+        <p14:creationId xmlns:p14="http://schemas.microsoft.com/office/powerpoint/2010/main" val="404111997"/>
       </p:ext>
     </p:extLst>
   </p:cSld>
@@ -19047,7 +19047,7 @@
     </p:spTree>
     <p:extLst>
       <p:ext uri="{BB962C8B-B14F-4D97-AF65-F5344CB8AC3E}">
-        <p14:creationId xmlns:p14="http://schemas.microsoft.com/office/powerpoint/2010/main" val="1990552504"/>
+        <p14:creationId xmlns:p14="http://schemas.microsoft.com/office/powerpoint/2010/main" val="859634664"/>
       </p:ext>
     </p:extLst>
   </p:cSld>
@@ -20128,7 +20128,7 @@
     </p:spTree>
     <p:extLst>
       <p:ext uri="{BB962C8B-B14F-4D97-AF65-F5344CB8AC3E}">
-        <p14:creationId xmlns:p14="http://schemas.microsoft.com/office/powerpoint/2010/main" val="1383168182"/>
+        <p14:creationId xmlns:p14="http://schemas.microsoft.com/office/powerpoint/2010/main" val="824836648"/>
       </p:ext>
     </p:extLst>
   </p:cSld>
@@ -20533,7 +20533,7 @@
     </p:spTree>
     <p:extLst>
       <p:ext uri="{BB962C8B-B14F-4D97-AF65-F5344CB8AC3E}">
-        <p14:creationId xmlns:p14="http://schemas.microsoft.com/office/powerpoint/2010/main" val="2006986981"/>
+        <p14:creationId xmlns:p14="http://schemas.microsoft.com/office/powerpoint/2010/main" val="2709979644"/>
       </p:ext>
     </p:extLst>
   </p:cSld>
@@ -20647,7 +20647,7 @@
     </p:spTree>
     <p:extLst>
       <p:ext uri="{BB962C8B-B14F-4D97-AF65-F5344CB8AC3E}">
-        <p14:creationId xmlns:p14="http://schemas.microsoft.com/office/powerpoint/2010/main" val="4136199726"/>
+        <p14:creationId xmlns:p14="http://schemas.microsoft.com/office/powerpoint/2010/main" val="2039394836"/>
       </p:ext>
     </p:extLst>
   </p:cSld>

</xml_diff>